<commit_message>
Update Final Project - Group 3.pptx
</commit_message>
<xml_diff>
--- a/Sean/Presentation/Final Project - Group 3.pptx
+++ b/Sean/Presentation/Final Project - Group 3.pptx
@@ -1820,7 +1820,7 @@
 </file>
 
 <file path=ppt/slides/slide3.xml><?xml version="1.0" encoding="utf-8"?>
-<p:sld xmlns:a="http://schemas.openxmlformats.org/drawingml/2006/main" xmlns:r="http://schemas.openxmlformats.org/officeDocument/2006/relationships" xmlns:p="http://schemas.openxmlformats.org/presentationml/2006/main" showMasterSp="0" show="0">
+<p:sld xmlns:a="http://schemas.openxmlformats.org/drawingml/2006/main" xmlns:r="http://schemas.openxmlformats.org/officeDocument/2006/relationships" xmlns:p="http://schemas.openxmlformats.org/presentationml/2006/main" showMasterSp="0">
   <p:cSld>
     <p:spTree>
       <p:nvGrpSpPr>
@@ -1922,7 +1922,7 @@
                   <a:schemeClr val="tx1"/>
                 </a:solidFill>
               </a:rPr>
-              <a:t>Built a website using GitHub Pages</a:t>
+              <a:t>Built a website using GitHub Pages and Hugo</a:t>
             </a:r>
           </a:p>
         </p:txBody>
@@ -4458,7 +4458,7 @@
                 </a:solidFill>
                 <a:cs typeface="Book Antiqua"/>
               </a:rPr>
-              <a:t>Used Google’s Go language to build the background infrastructure for a potential blogging website</a:t>
+              <a:t>Used Python and Google’s Go language to build the background infrastructure for a potential blogging website</a:t>
             </a:r>
           </a:p>
           <a:p>
@@ -5556,7 +5556,7 @@
 </file>
 
 <file path=ppt/slides/slide7.xml><?xml version="1.0" encoding="utf-8"?>
-<p:sld xmlns:a="http://schemas.openxmlformats.org/drawingml/2006/main" xmlns:r="http://schemas.openxmlformats.org/officeDocument/2006/relationships" xmlns:p="http://schemas.openxmlformats.org/presentationml/2006/main" showMasterSp="0" show="0">
+<p:sld xmlns:a="http://schemas.openxmlformats.org/drawingml/2006/main" xmlns:r="http://schemas.openxmlformats.org/officeDocument/2006/relationships" xmlns:p="http://schemas.openxmlformats.org/presentationml/2006/main" showMasterSp="0">
   <p:cSld>
     <p:spTree>
       <p:nvGrpSpPr>

</xml_diff>